<commit_message>
Minor fixes for "12. Streams, Files and Directories" slides
</commit_message>
<xml_diff>
--- a/Courses/Software-Sciences/Module-2-DS-and-Algo-New/12-Streams-Files-and-Directories/12-Streams-Files-and-Directories.pptx
+++ b/Courses/Software-Sciences/Module-2-DS-and-Algo-New/12-Streams-Files-and-Directories/12-Streams-Files-and-Directories.pptx
@@ -326,7 +326,7 @@
           <a:p>
             <a:fld id="{4E087215-0C8F-4762-A664-737A353EC9A4}" type="datetimeFigureOut">
               <a:rPr lang="bg-BG" smtClean="0"/>
-              <a:t>3.3.2023 г.</a:t>
+              <a:t>3.03.23 г.</a:t>
             </a:fld>
             <a:endParaRPr lang="bg-BG"/>
           </a:p>
@@ -517,7 +517,7 @@
           <a:p>
             <a:fld id="{72D84649-876A-46C9-8472-14CB09C070D8}" type="datetimeFigureOut">
               <a:rPr lang="en-US" smtClean="0"/>
-              <a:t>3/3/2023</a:t>
+              <a:t>3/3/23</a:t>
             </a:fld>
             <a:endParaRPr lang="en-US"/>
           </a:p>
@@ -9427,7 +9427,19 @@
               <a:rPr lang="en-US" sz="3550" dirty="0" err="1">
                 <a:cs typeface="Calibri"/>
               </a:rPr>
-              <a:t>маниполиране</a:t>
+              <a:t>манип</a:t>
+            </a:r>
+            <a:r>
+              <a:rPr lang="bg-BG" sz="3550" dirty="0">
+                <a:cs typeface="Calibri"/>
+              </a:rPr>
+              <a:t>у</a:t>
+            </a:r>
+            <a:r>
+              <a:rPr lang="en-US" sz="3550" dirty="0" err="1">
+                <a:cs typeface="Calibri"/>
+              </a:rPr>
+              <a:t>лиране</a:t>
             </a:r>
             <a:r>
               <a:rPr lang="en-US" sz="3550" dirty="0">
@@ -9453,6 +9465,9 @@
               </a:rPr>
               <a:t>файлове</a:t>
             </a:r>
+            <a:endParaRPr lang="en-US" sz="3550" dirty="0">
+              <a:cs typeface="Calibri"/>
+            </a:endParaRPr>
           </a:p>
         </p:txBody>
       </p:sp>
@@ -9736,7 +9751,7 @@
             </a:r>
             <a:r>
               <a:rPr lang="en-US" sz="3350" dirty="0" err="1"/>
-              <a:t>вашият</a:t>
+              <a:t>вашия</a:t>
             </a:r>
             <a:r>
               <a:rPr lang="en-US" sz="3350" dirty="0"/>
@@ -9776,6 +9791,10 @@
               <a:t>Отпечатайте</a:t>
             </a:r>
             <a:r>
+              <a:rPr lang="bg-BG" sz="3350" dirty="0"/>
+              <a:t> съдържанието на</a:t>
+            </a:r>
+            <a:r>
               <a:rPr lang="en-US" sz="3350" dirty="0"/>
               <a:t> </a:t>
             </a:r>
@@ -9823,7 +9842,7 @@
               <a:rPr lang="en-US" sz="3350" dirty="0" err="1"/>
               <a:t>конзолата</a:t>
             </a:r>
-            <a:endParaRPr lang="en-US" sz="3350" dirty="0" err="1">
+            <a:endParaRPr lang="en-US" sz="3350" dirty="0">
               <a:cs typeface="Calibri"/>
             </a:endParaRPr>
           </a:p>
@@ -9851,7 +9870,15 @@
             </a:r>
             <a:r>
               <a:rPr lang="en-US" sz="3350" dirty="0" err="1"/>
-              <a:t>бройм</a:t>
+              <a:t>бро</a:t>
+            </a:r>
+            <a:r>
+              <a:rPr lang="bg-BG" sz="3350" dirty="0"/>
+              <a:t>и</a:t>
+            </a:r>
+            <a:r>
+              <a:rPr lang="en-US" sz="3350" dirty="0" err="1"/>
+              <a:t>м</a:t>
             </a:r>
             <a:r>
               <a:rPr lang="en-US" sz="3350" dirty="0">
@@ -11753,14 +11780,14 @@
               <a:t> </a:t>
             </a:r>
             <a:r>
-              <a:rPr lang="en-US" sz="3150" dirty="0" err="1">
+              <a:rPr lang="bg-BG" sz="3150" dirty="0">
                 <a:solidFill>
                   <a:srgbClr val="234465"/>
                 </a:solidFill>
                 <a:latin typeface="Calibri"/>
                 <a:cs typeface="Calibri"/>
               </a:rPr>
-              <a:t>на</a:t>
+              <a:t>в</a:t>
             </a:r>
             <a:r>
               <a:rPr lang="en-US" sz="3150" dirty="0">
@@ -13470,13 +13497,21 @@
           <a:p>
             <a:r>
               <a:rPr lang="en-US" sz="3950" dirty="0"/>
-              <a:t>Try-Catch-Finally </a:t>
+              <a:t>Try-Catch-Finally</a:t>
+            </a:r>
+            <a:r>
+              <a:rPr lang="bg-BG" sz="3950" dirty="0"/>
+              <a:t> –</a:t>
+            </a:r>
+            <a:r>
+              <a:rPr lang="en-US" sz="3950" dirty="0"/>
+              <a:t> </a:t>
             </a:r>
             <a:r>
               <a:rPr lang="en-US" sz="3950" dirty="0" err="1"/>
               <a:t>пример</a:t>
             </a:r>
-            <a:endParaRPr lang="en-US" dirty="0" err="1"/>
+            <a:endParaRPr lang="en-US" dirty="0"/>
           </a:p>
         </p:txBody>
       </p:sp>
@@ -13979,13 +14014,13 @@
         </p:nvSpPr>
         <p:spPr bwMode="auto">
           <a:xfrm>
-            <a:off x="7670591" y="5183543"/>
-            <a:ext cx="3599063" cy="989742"/>
+            <a:off x="7670591" y="5183542"/>
+            <a:ext cx="3060409" cy="1323458"/>
           </a:xfrm>
           <a:prstGeom prst="wedgeRoundRectCallout">
             <a:avLst>
-              <a:gd name="adj1" fmla="val -68933"/>
-              <a:gd name="adj2" fmla="val 21003"/>
+              <a:gd name="adj1" fmla="val -77055"/>
+              <a:gd name="adj2" fmla="val 4904"/>
               <a:gd name="adj3" fmla="val 16667"/>
             </a:avLst>
           </a:prstGeom>
@@ -14039,12 +14074,12 @@
               <a:t>Вместо</a:t>
             </a:r>
             <a:r>
-              <a:rPr lang="en-US" sz="2350" b="1" dirty="0">
+              <a:rPr lang="bg-BG" sz="2350" b="1" dirty="0">
                 <a:solidFill>
                   <a:srgbClr val="FFFFFF"/>
                 </a:solidFill>
               </a:rPr>
-              <a:t> </a:t>
+              <a:t> </a:t>
             </a:r>
             <a:r>
               <a:rPr lang="en-US" sz="2350" b="1" dirty="0">
@@ -14055,15 +14090,15 @@
                   </a:schemeClr>
                 </a:solidFill>
               </a:rPr>
-              <a:t>try-finally</a:t>
-            </a:r>
-            <a:r>
-              <a:rPr lang="en-US" sz="2350" b="1" dirty="0">
+              <a:t>using(reader) </a:t>
+            </a:r>
+            <a:r>
+              <a:rPr lang="bg-BG" sz="2350" b="1" dirty="0">
                 <a:solidFill>
                   <a:srgbClr val="FFFFFF"/>
                 </a:solidFill>
               </a:rPr>
-              <a:t>, </a:t>
+              <a:t>  </a:t>
             </a:r>
             <a:r>
               <a:rPr lang="en-US" sz="2350" b="1" dirty="0" err="1">
@@ -14122,7 +14157,7 @@
                   </a:schemeClr>
                 </a:solidFill>
               </a:rPr>
-              <a:t>using(reader)</a:t>
+              <a:t>try-finally</a:t>
             </a:r>
             <a:endParaRPr lang="en-US" sz="2350" b="1" noProof="1">
               <a:solidFill>
@@ -14771,90 +14806,95 @@
             <p:ph type="title" sz="quarter" idx="10"/>
           </p:nvPr>
         </p:nvSpPr>
-        <p:spPr/>
+        <p:spPr>
+          <a:xfrm>
+            <a:off x="201000" y="4731634"/>
+            <a:ext cx="11576891" cy="1424175"/>
+          </a:xfrm>
+        </p:spPr>
         <p:txBody>
           <a:bodyPr/>
           <a:lstStyle/>
           <a:p>
             <a:r>
-              <a:rPr lang="en-GB" sz="5350" dirty="0" err="1">
+              <a:rPr lang="en-GB" sz="4800" dirty="0" err="1">
                 <a:cs typeface="Arial"/>
               </a:rPr>
               <a:t>Четене</a:t>
             </a:r>
             <a:r>
-              <a:rPr lang="en-GB" sz="5350" dirty="0">
+              <a:rPr lang="en-GB" sz="4800" dirty="0">
                 <a:cs typeface="Arial"/>
               </a:rPr>
-              <a:t>/ </a:t>
-            </a:r>
-            <a:r>
-              <a:rPr lang="en-GB" sz="5350" dirty="0" err="1">
+              <a:t>/</a:t>
+            </a:r>
+            <a:r>
+              <a:rPr lang="en-GB" sz="4800" dirty="0" err="1">
                 <a:cs typeface="Arial"/>
               </a:rPr>
               <a:t>Писане</a:t>
             </a:r>
             <a:r>
-              <a:rPr lang="en-GB" sz="5350" dirty="0">
+              <a:rPr lang="en-GB" sz="4800" dirty="0">
                 <a:cs typeface="Arial"/>
               </a:rPr>
               <a:t> </a:t>
             </a:r>
             <a:r>
-              <a:rPr lang="en-GB" sz="5350" dirty="0" err="1">
+              <a:rPr lang="en-GB" sz="4800" dirty="0" err="1">
                 <a:cs typeface="Arial"/>
               </a:rPr>
               <a:t>на</a:t>
             </a:r>
             <a:r>
-              <a:rPr lang="en-GB" sz="5350" dirty="0">
+              <a:rPr lang="en-GB" sz="4800" dirty="0">
                 <a:cs typeface="Arial"/>
               </a:rPr>
               <a:t> </a:t>
             </a:r>
             <a:r>
-              <a:rPr lang="en-GB" sz="5350" dirty="0" err="1">
+              <a:rPr lang="en-GB" sz="4800" dirty="0" err="1">
                 <a:cs typeface="Arial"/>
               </a:rPr>
               <a:t>информация</a:t>
             </a:r>
             <a:r>
-              <a:rPr lang="en-GB" sz="5350" dirty="0">
+              <a:rPr lang="en-GB" sz="4800" dirty="0">
                 <a:cs typeface="Arial"/>
               </a:rPr>
               <a:t> </a:t>
             </a:r>
             <a:r>
-              <a:rPr lang="en-GB" sz="5350" dirty="0" err="1">
+              <a:rPr lang="en-GB" sz="4800" dirty="0" err="1">
                 <a:cs typeface="Arial"/>
               </a:rPr>
               <a:t>от</a:t>
             </a:r>
             <a:r>
-              <a:rPr lang="en-GB" sz="5350" dirty="0">
+              <a:rPr lang="en-GB" sz="4800" dirty="0">
                 <a:cs typeface="Arial"/>
               </a:rPr>
-              <a:t> / </a:t>
-            </a:r>
-            <a:r>
-              <a:rPr lang="en-GB" sz="5350" dirty="0" err="1">
+              <a:t>/</a:t>
+            </a:r>
+            <a:r>
+              <a:rPr lang="en-GB" sz="4800" dirty="0" err="1">
                 <a:cs typeface="Arial"/>
               </a:rPr>
               <a:t>на</a:t>
             </a:r>
             <a:r>
-              <a:rPr lang="en-GB" sz="5350" dirty="0">
+              <a:rPr lang="en-GB" sz="4800" dirty="0">
                 <a:cs typeface="Arial"/>
               </a:rPr>
               <a:t> </a:t>
             </a:r>
             <a:r>
-              <a:rPr lang="en-GB" sz="5350" dirty="0" err="1">
+              <a:rPr lang="en-GB" sz="4800" dirty="0" err="1">
                 <a:cs typeface="Arial"/>
               </a:rPr>
               <a:t>файлове</a:t>
             </a:r>
-            <a:endParaRPr lang="bg-BG" sz="5350" dirty="0" err="1">
+            <a:endParaRPr lang="bg-BG" sz="4800" dirty="0" err="1">
               <a:cs typeface="Arial"/>
             </a:endParaRPr>
           </a:p>
@@ -14943,7 +14983,7 @@
             </a:r>
             <a:r>
               <a:rPr lang="en-US" sz="3600" dirty="0"/>
-              <a:t> / </a:t>
+              <a:t>/</a:t>
             </a:r>
             <a:r>
               <a:rPr lang="bg-BG" sz="3600" dirty="0"/>
@@ -14974,18 +15014,6 @@
                   <a:schemeClr val="bg1"/>
                 </a:solidFill>
               </a:rPr>
-              <a:t> </a:t>
-            </a:r>
-            <a:r>
-              <a:rPr lang="en-US" sz="3600" b="1" dirty="0" err="1">
-                <a:solidFill>
-                  <a:schemeClr val="bg1"/>
-                </a:solidFill>
-              </a:rPr>
-              <a:t>на</a:t>
-            </a:r>
-            <a:r>
-              <a:rPr lang="en-US" sz="3600" dirty="0"/>
               <a:t> </a:t>
             </a:r>
             <a:r>
@@ -15262,7 +15290,31 @@
                 <a:latin typeface="Consolas"/>
                 <a:cs typeface="Consolas" panose="020B0609020204030204" pitchFamily="49" charset="0"/>
               </a:rPr>
-              <a:t>// За да напишите във файл: fs.Write(byte[]) …</a:t>
+              <a:t>// За да напиш</a:t>
+            </a:r>
+            <a:r>
+              <a:rPr lang="bg-BG" sz="2350" b="1" noProof="1">
+                <a:solidFill>
+                  <a:schemeClr val="accent2">
+                    <a:lumMod val="75000"/>
+                  </a:schemeClr>
+                </a:solidFill>
+                <a:latin typeface="Consolas"/>
+                <a:cs typeface="Consolas" panose="020B0609020204030204" pitchFamily="49" charset="0"/>
+              </a:rPr>
+              <a:t>е</a:t>
+            </a:r>
+            <a:r>
+              <a:rPr lang="en-US" sz="2350" b="1" noProof="1">
+                <a:solidFill>
+                  <a:schemeClr val="accent2">
+                    <a:lumMod val="75000"/>
+                  </a:schemeClr>
+                </a:solidFill>
+                <a:latin typeface="Consolas"/>
+                <a:cs typeface="Consolas" panose="020B0609020204030204" pitchFamily="49" charset="0"/>
+              </a:rPr>
+              <a:t>те във файл: fs.Write(byte[]) …</a:t>
             </a:r>
           </a:p>
           <a:p>
@@ -15788,7 +15840,7 @@
         </p:nvSpPr>
         <p:spPr bwMode="auto">
           <a:xfrm>
-            <a:off x="504487" y="1583977"/>
+            <a:off x="533464" y="1899000"/>
             <a:ext cx="11125072" cy="4190825"/>
           </a:xfrm>
           <a:prstGeom prst="rect">
@@ -16044,8 +16096,8 @@
         </p:nvSpPr>
         <p:spPr bwMode="auto">
           <a:xfrm>
-            <a:off x="5601129" y="3184217"/>
-            <a:ext cx="5173652" cy="990342"/>
+            <a:off x="5630106" y="3499240"/>
+            <a:ext cx="4589871" cy="990342"/>
           </a:xfrm>
           <a:prstGeom prst="wedgeRoundRectCallout">
             <a:avLst>
@@ -16542,7 +16594,7 @@
             </a:r>
             <a:r>
               <a:rPr lang="en-US" sz="3950" dirty="0"/>
-              <a:t> / </a:t>
+              <a:t>/</a:t>
             </a:r>
             <a:r>
               <a:rPr lang="en-US" sz="3950" dirty="0" err="1"/>
@@ -16875,8 +16927,8 @@
           </a:xfrm>
           <a:prstGeom prst="wedgeRoundRectCallout">
             <a:avLst>
-              <a:gd name="adj1" fmla="val -57877"/>
-              <a:gd name="adj2" fmla="val 46557"/>
+              <a:gd name="adj1" fmla="val -42712"/>
+              <a:gd name="adj2" fmla="val 70870"/>
               <a:gd name="adj3" fmla="val 16667"/>
             </a:avLst>
           </a:prstGeom>
@@ -16938,7 +16990,7 @@
                   <a:schemeClr val="bg2"/>
                 </a:solidFill>
               </a:rPr>
-              <a:t> с константен параметър параметър</a:t>
+              <a:t> с константен параметър</a:t>
             </a:r>
             <a:endParaRPr lang="en-US" dirty="0">
               <a:solidFill>
@@ -18000,14 +18052,14 @@
               <a:t> </a:t>
             </a:r>
             <a:r>
-              <a:rPr lang="en-US" b="1" dirty="0" err="1">
+              <a:rPr lang="en-US" b="1" dirty="0">
                 <a:solidFill>
                   <a:schemeClr val="bg1"/>
                 </a:solidFill>
               </a:rPr>
-              <a:t>файл</a:t>
-            </a:r>
-            <a:endParaRPr lang="en-US" dirty="0" err="1">
+              <a:t>File</a:t>
+            </a:r>
+            <a:endParaRPr lang="en-US" dirty="0">
               <a:solidFill>
                 <a:schemeClr val="bg1"/>
               </a:solidFill>
@@ -18027,7 +18079,11 @@
               <a:t>5.</a:t>
             </a:r>
             <a:r>
-              <a:rPr lang="en-US" dirty="0">
+              <a:rPr lang="bg-BG" dirty="0"/>
+              <a:t> </a:t>
+            </a:r>
+            <a:r>
+              <a:rPr lang="en-US" dirty="0" err="1">
                 <a:ea typeface="+mn-lt"/>
                 <a:cs typeface="+mn-lt"/>
               </a:rPr>
@@ -18038,12 +18094,12 @@
               <a:t> </a:t>
             </a:r>
             <a:r>
-              <a:rPr lang="en-US" b="1" dirty="0" err="1">
+              <a:rPr lang="en-US" b="1" dirty="0">
                 <a:solidFill>
                   <a:schemeClr val="bg1"/>
                 </a:solidFill>
               </a:rPr>
-              <a:t>директория</a:t>
+              <a:t>Directory</a:t>
             </a:r>
             <a:r>
               <a:rPr lang="en-US" dirty="0"/>
@@ -19147,8 +19203,8 @@
           <a:p>
             <a:pPr marL="360045" indent="-360045"/>
             <a:r>
-              <a:rPr lang="en-US" sz="3350" noProof="1"/>
-              <a:t>Писане на </a:t>
+              <a:rPr lang="bg-BG" sz="3350" noProof="1"/>
+              <a:t>Пише </a:t>
             </a:r>
             <a:r>
               <a:rPr lang="en-US" sz="3350" b="1" noProof="1">
@@ -19235,7 +19291,23 @@
                   <a:srgbClr val="234465"/>
                 </a:solidFill>
               </a:rPr>
-              <a:t>допълнителен текст към сеществуващ файл</a:t>
+              <a:t>допълнителен текст към с</a:t>
+            </a:r>
+            <a:r>
+              <a:rPr lang="bg-BG" sz="3350" noProof="1">
+                <a:solidFill>
+                  <a:srgbClr val="234465"/>
+                </a:solidFill>
+              </a:rPr>
+              <a:t>ъ</a:t>
+            </a:r>
+            <a:r>
+              <a:rPr lang="en-US" sz="3350" noProof="1">
+                <a:solidFill>
+                  <a:srgbClr val="234465"/>
+                </a:solidFill>
+              </a:rPr>
+              <a:t>ществуващ файл</a:t>
             </a:r>
             <a:r>
               <a:rPr lang="en-US" sz="3350" noProof="1"/>
@@ -20217,7 +20289,7 @@
             </a:r>
             <a:r>
               <a:rPr lang="en-US" sz="3950" dirty="0"/>
-              <a:t>/ </a:t>
+              <a:t>/</a:t>
             </a:r>
             <a:r>
               <a:rPr lang="en-US" sz="3950" dirty="0" err="1"/>
@@ -20247,6 +20319,7 @@
               <a:rPr lang="en-US" sz="3950" dirty="0" err="1"/>
               <a:t>файл</a:t>
             </a:r>
+            <a:endParaRPr lang="en-US" sz="3950" dirty="0"/>
           </a:p>
         </p:txBody>
       </p:sp>
@@ -21059,19 +21132,7 @@
               <a:rPr lang="en-US" sz="5350" dirty="0">
                 <a:cs typeface="Arial"/>
               </a:rPr>
-              <a:t> </a:t>
-            </a:r>
-            <a:r>
-              <a:rPr lang="en-US" sz="5350" dirty="0" err="1">
-                <a:cs typeface="Arial"/>
-              </a:rPr>
-              <a:t>директория</a:t>
-            </a:r>
-            <a:r>
-              <a:rPr lang="en-US" sz="5350" dirty="0">
-                <a:cs typeface="Arial"/>
-              </a:rPr>
-              <a:t> в .NET</a:t>
+              <a:t> Directory в .NET</a:t>
             </a:r>
             <a:endParaRPr lang="bg-BG" sz="5350" dirty="0">
               <a:cs typeface="Arial"/>
@@ -21200,11 +21261,25 @@
               <a:t> </a:t>
             </a:r>
             <a:r>
+              <a:rPr lang="bg-BG" sz="3350" dirty="0">
+                <a:ea typeface="+mn-lt"/>
+                <a:cs typeface="+mn-lt"/>
+              </a:rPr>
+              <a:t>ѝ</a:t>
+            </a:r>
+            <a:r>
+              <a:rPr lang="en-US" sz="3350" dirty="0">
+                <a:ea typeface="+mn-lt"/>
+                <a:cs typeface="+mn-lt"/>
+              </a:rPr>
+              <a:t> </a:t>
+            </a:r>
+            <a:r>
               <a:rPr lang="en-US" sz="3350" dirty="0" err="1">
                 <a:ea typeface="+mn-lt"/>
                 <a:cs typeface="+mn-lt"/>
               </a:rPr>
-              <a:t>му</a:t>
+              <a:t>поддиректории</a:t>
             </a:r>
             <a:r>
               <a:rPr lang="en-US" sz="3350" dirty="0">
@@ -21218,7 +21293,7 @@
                 <a:ea typeface="+mn-lt"/>
                 <a:cs typeface="+mn-lt"/>
               </a:rPr>
-              <a:t>поддиректории</a:t>
+              <a:t>по</a:t>
             </a:r>
             <a:r>
               <a:rPr lang="en-US" sz="3350" dirty="0">
@@ -21232,7 +21307,7 @@
                 <a:ea typeface="+mn-lt"/>
                 <a:cs typeface="+mn-lt"/>
               </a:rPr>
-              <a:t>по</a:t>
+              <a:t>посочения</a:t>
             </a:r>
             <a:r>
               <a:rPr lang="en-US" sz="3350" dirty="0">
@@ -21246,39 +21321,39 @@
                 <a:ea typeface="+mn-lt"/>
                 <a:cs typeface="+mn-lt"/>
               </a:rPr>
-              <a:t>посочения</a:t>
+              <a:t>път</a:t>
+            </a:r>
+            <a:r>
+              <a:rPr lang="en-US" sz="3350" dirty="0"/>
+              <a:t>),</a:t>
             </a:r>
             <a:r>
               <a:rPr lang="en-US" sz="3350" dirty="0">
                 <a:ea typeface="+mn-lt"/>
                 <a:cs typeface="+mn-lt"/>
               </a:rPr>
-              <a:t> </a:t>
+              <a:t> </a:t>
             </a:r>
             <a:r>
               <a:rPr lang="en-US" sz="3350" dirty="0" err="1">
                 <a:ea typeface="+mn-lt"/>
                 <a:cs typeface="+mn-lt"/>
               </a:rPr>
-              <a:t>път</a:t>
-            </a:r>
-            <a:r>
-              <a:rPr lang="en-US" sz="3350" dirty="0"/>
-              <a:t>),</a:t>
+              <a:t>освен</a:t>
             </a:r>
             <a:r>
               <a:rPr lang="en-US" sz="3350" dirty="0">
                 <a:ea typeface="+mn-lt"/>
                 <a:cs typeface="+mn-lt"/>
               </a:rPr>
-              <a:t> </a:t>
+              <a:t> </a:t>
             </a:r>
             <a:r>
               <a:rPr lang="en-US" sz="3350" dirty="0" err="1">
                 <a:ea typeface="+mn-lt"/>
                 <a:cs typeface="+mn-lt"/>
               </a:rPr>
-              <a:t>освен</a:t>
+              <a:t>ако</a:t>
             </a:r>
             <a:r>
               <a:rPr lang="en-US" sz="3350" dirty="0">
@@ -21292,7 +21367,7 @@
                 <a:ea typeface="+mn-lt"/>
                 <a:cs typeface="+mn-lt"/>
               </a:rPr>
-              <a:t>ако</a:t>
+              <a:t>вече</a:t>
             </a:r>
             <a:r>
               <a:rPr lang="en-US" sz="3350" dirty="0">
@@ -21302,35 +21377,30 @@
               <a:t> </a:t>
             </a:r>
             <a:r>
-              <a:rPr lang="en-US" sz="3350" dirty="0" err="1">
+              <a:rPr lang="en-US" sz="3350" b="1" dirty="0" err="1">
+                <a:solidFill>
+                  <a:schemeClr val="bg1"/>
+                </a:solidFill>
                 <a:ea typeface="+mn-lt"/>
                 <a:cs typeface="+mn-lt"/>
               </a:rPr>
-              <a:t>вече</a:t>
-            </a:r>
-            <a:r>
-              <a:rPr lang="en-US" sz="3350" dirty="0">
+              <a:t>не</a:t>
+            </a:r>
+            <a:r>
+              <a:rPr lang="en-US" sz="3350" b="1" dirty="0">
+                <a:solidFill>
+                  <a:schemeClr val="bg1"/>
+                </a:solidFill>
                 <a:ea typeface="+mn-lt"/>
                 <a:cs typeface="+mn-lt"/>
               </a:rPr>
               <a:t> </a:t>
             </a:r>
             <a:r>
-              <a:rPr lang="en-US" sz="3350" dirty="0" err="1">
-                <a:ea typeface="+mn-lt"/>
-                <a:cs typeface="+mn-lt"/>
-              </a:rPr>
-              <a:t>не</a:t>
-            </a:r>
-            <a:r>
-              <a:rPr lang="en-US" sz="3350" dirty="0">
-                <a:ea typeface="+mn-lt"/>
-                <a:cs typeface="+mn-lt"/>
-              </a:rPr>
-              <a:t> </a:t>
-            </a:r>
-            <a:r>
-              <a:rPr lang="en-US" sz="3350" dirty="0" err="1">
+              <a:rPr lang="en-US" sz="3350" b="1" dirty="0" err="1">
+                <a:solidFill>
+                  <a:schemeClr val="bg1"/>
+                </a:solidFill>
                 <a:ea typeface="+mn-lt"/>
                 <a:cs typeface="+mn-lt"/>
               </a:rPr>
@@ -21539,7 +21609,11 @@
             </a:r>
             <a:r>
               <a:rPr lang="en-US" sz="3950" dirty="0" err="1"/>
-              <a:t>операций</a:t>
+              <a:t>операци</a:t>
+            </a:r>
+            <a:r>
+              <a:rPr lang="bg-BG" sz="3950" dirty="0"/>
+              <a:t>и</a:t>
             </a:r>
             <a:r>
               <a:rPr lang="en-US" sz="3950" dirty="0"/>
@@ -21555,9 +21629,13 @@
             </a:r>
             <a:r>
               <a:rPr lang="en-US" sz="3950" dirty="0" err="1"/>
-              <a:t>директорий</a:t>
-            </a:r>
-            <a:endParaRPr lang="en-US" dirty="0" err="1"/>
+              <a:t>директори</a:t>
+            </a:r>
+            <a:r>
+              <a:rPr lang="bg-BG" sz="3950" dirty="0"/>
+              <a:t>и</a:t>
+            </a:r>
+            <a:endParaRPr lang="en-US" dirty="0"/>
           </a:p>
         </p:txBody>
       </p:sp>
@@ -22185,11 +22263,27 @@
             </a:r>
             <a:r>
               <a:rPr lang="en-US" sz="3350" dirty="0"/>
-              <a:t>) в </a:t>
+              <a:t>) </a:t>
             </a:r>
             <a:r>
               <a:rPr lang="en-US" sz="3350" dirty="0" err="1"/>
-              <a:t>опредилена</a:t>
+              <a:t>в</a:t>
+            </a:r>
+            <a:r>
+              <a:rPr lang="en-US" sz="3350" dirty="0"/>
+              <a:t> </a:t>
+            </a:r>
+            <a:r>
+              <a:rPr lang="en-US" sz="3350" dirty="0" err="1"/>
+              <a:t>опред</a:t>
+            </a:r>
+            <a:r>
+              <a:rPr lang="bg-BG" sz="3350" dirty="0"/>
+              <a:t>е</a:t>
+            </a:r>
+            <a:r>
+              <a:rPr lang="en-US" sz="3350" dirty="0" err="1"/>
+              <a:t>лена</a:t>
             </a:r>
             <a:r>
               <a:rPr lang="en-US" sz="3350" dirty="0"/>
@@ -22885,7 +22979,15 @@
                   <a:schemeClr val="bg1"/>
                 </a:solidFill>
               </a:rPr>
-              <a:t>размерът</a:t>
+              <a:t>размер</a:t>
+            </a:r>
+            <a:r>
+              <a:rPr lang="bg-BG" sz="3350" b="1" dirty="0">
+                <a:solidFill>
+                  <a:schemeClr val="bg1"/>
+                </a:solidFill>
+              </a:rPr>
+              <a:t>а</a:t>
             </a:r>
             <a:r>
               <a:rPr lang="en-US" sz="3350" b="1" dirty="0">
@@ -23006,11 +23108,27 @@
             </a:r>
             <a:r>
               <a:rPr lang="en-US" sz="3350" dirty="0" err="1"/>
-              <a:t>резултатът</a:t>
+              <a:t>резултат</a:t>
+            </a:r>
+            <a:r>
+              <a:rPr lang="bg-BG" sz="3350" dirty="0"/>
+              <a:t>а</a:t>
             </a:r>
             <a:r>
               <a:rPr lang="en-US" sz="3350" dirty="0"/>
-              <a:t> в </a:t>
+              <a:t> </a:t>
+            </a:r>
+            <a:r>
+              <a:rPr lang="en-US" sz="3350" dirty="0" err="1"/>
+              <a:t>в</a:t>
+            </a:r>
+            <a:r>
+              <a:rPr lang="bg-BG" sz="3350" dirty="0"/>
+              <a:t>ъв</a:t>
+            </a:r>
+            <a:r>
+              <a:rPr lang="en-US" sz="3350" dirty="0"/>
+              <a:t> </a:t>
             </a:r>
             <a:r>
               <a:rPr lang="en-US" sz="3350" dirty="0" err="1"/>
@@ -23063,7 +23181,7 @@
             </a:r>
             <a:r>
               <a:rPr lang="en-US" sz="3950" dirty="0"/>
-              <a:t> : </a:t>
+              <a:t>: </a:t>
             </a:r>
             <a:r>
               <a:rPr lang="en-US" sz="3950" dirty="0" err="1"/>
@@ -23117,7 +23235,7 @@
         </p:nvSpPr>
         <p:spPr>
           <a:xfrm>
-            <a:off x="777618" y="4463374"/>
+            <a:off x="3936000" y="4824000"/>
             <a:ext cx="3104191" cy="587994"/>
           </a:xfrm>
           <a:prstGeom prst="rect">
@@ -23196,7 +23314,7 @@
         </p:nvSpPr>
         <p:spPr>
           <a:xfrm>
-            <a:off x="777618" y="5051369"/>
+            <a:off x="3936000" y="5411995"/>
             <a:ext cx="3104191" cy="587994"/>
           </a:xfrm>
           <a:prstGeom prst="rect">
@@ -23556,7 +23674,7 @@
         <p:spPr/>
         <p:txBody>
           <a:bodyPr>
-            <a:normAutofit fontScale="90000"/>
+            <a:normAutofit/>
           </a:bodyPr>
           <a:lstStyle/>
           <a:p>
@@ -23566,7 +23684,7 @@
             </a:r>
             <a:r>
               <a:rPr lang="en-US" sz="3950" dirty="0"/>
-              <a:t> :</a:t>
+              <a:t>:</a:t>
             </a:r>
             <a:r>
               <a:rPr lang="en-US" sz="3950" dirty="0">
@@ -23638,7 +23756,7 @@
               </a:rPr>
               <a:t>папка</a:t>
             </a:r>
-            <a:endParaRPr lang="en-US" sz="3950" dirty="0" err="1"/>
+            <a:endParaRPr lang="en-US" sz="3950" dirty="0"/>
           </a:p>
         </p:txBody>
       </p:sp>
@@ -23930,8 +24048,8 @@
           </a:xfrm>
           <a:prstGeom prst="wedgeRoundRectCallout">
             <a:avLst>
-              <a:gd name="adj1" fmla="val 34796"/>
-              <a:gd name="adj2" fmla="val -93432"/>
+              <a:gd name="adj1" fmla="val 28296"/>
+              <a:gd name="adj2" fmla="val -85507"/>
               <a:gd name="adj3" fmla="val 16667"/>
             </a:avLst>
           </a:prstGeom>
@@ -23984,11 +24102,50 @@
                 <a:ea typeface="+mn-lt"/>
                 <a:cs typeface="+mn-lt"/>
               </a:rPr>
-              <a:t>Получаваме всички файлове от дадената папка и нейните подпапки</a:t>
-            </a:r>
-            <a:endParaRPr lang="bg-BG" dirty="0">
+              <a:t>Получаваме </a:t>
+            </a:r>
+            <a:r>
+              <a:rPr lang="en-US" sz="2350" b="1" noProof="1">
+                <a:solidFill>
+                  <a:schemeClr val="bg1">
+                    <a:lumMod val="60000"/>
+                    <a:lumOff val="40000"/>
+                  </a:schemeClr>
+                </a:solidFill>
+                <a:ea typeface="+mn-lt"/>
+                <a:cs typeface="+mn-lt"/>
+              </a:rPr>
+              <a:t>всички файлове</a:t>
+            </a:r>
+            <a:r>
+              <a:rPr lang="en-US" sz="2350" noProof="1">
+                <a:solidFill>
+                  <a:schemeClr val="bg2"/>
+                </a:solidFill>
+                <a:ea typeface="+mn-lt"/>
+                <a:cs typeface="+mn-lt"/>
+              </a:rPr>
+              <a:t> от дадената папка и нейните </a:t>
+            </a:r>
+            <a:r>
+              <a:rPr lang="en-US" sz="2350" b="1" noProof="1">
+                <a:solidFill>
+                  <a:schemeClr val="bg1">
+                    <a:lumMod val="60000"/>
+                    <a:lumOff val="40000"/>
+                  </a:schemeClr>
+                </a:solidFill>
+                <a:ea typeface="+mn-lt"/>
+                <a:cs typeface="+mn-lt"/>
+              </a:rPr>
+              <a:t>подпапки</a:t>
+            </a:r>
+            <a:endParaRPr lang="bg-BG" b="1" dirty="0">
               <a:solidFill>
-                <a:schemeClr val="bg2"/>
+                <a:schemeClr val="bg1">
+                  <a:lumMod val="60000"/>
+                  <a:lumOff val="40000"/>
+                </a:schemeClr>
               </a:solidFill>
             </a:endParaRPr>
           </a:p>
@@ -25423,7 +25580,7 @@
                   <a:schemeClr val="bg2"/>
                 </a:solidFill>
               </a:rPr>
-              <a:t> / </a:t>
+              <a:t>/</a:t>
             </a:r>
             <a:r>
               <a:rPr lang="en-US" sz="3400" b="1" noProof="1">
@@ -25494,7 +25651,7 @@
               </a:rPr>
               <a:t>данни</a:t>
             </a:r>
-            <a:endParaRPr lang="en-US" sz="3400" dirty="0" err="1">
+            <a:endParaRPr lang="en-US" sz="3400" dirty="0">
               <a:solidFill>
                 <a:schemeClr val="bg2"/>
               </a:solidFill>
@@ -25569,7 +25726,7 @@
                   <a:schemeClr val="bg2"/>
                 </a:solidFill>
               </a:rPr>
-              <a:t> / </a:t>
+              <a:t>/</a:t>
             </a:r>
             <a:r>
               <a:rPr lang="en-US" sz="3400" dirty="0" err="1">
@@ -25712,7 +25869,7 @@
                   <a:schemeClr val="bg2"/>
                 </a:solidFill>
               </a:rPr>
-              <a:t> / </a:t>
+              <a:t>/</a:t>
             </a:r>
             <a:r>
               <a:rPr lang="en-GB" sz="3400" dirty="0" err="1">
@@ -25754,7 +25911,7 @@
               </a:rPr>
               <a:t>наведнъж</a:t>
             </a:r>
-            <a:endParaRPr lang="en-GB" sz="3400" dirty="0" err="1">
+            <a:endParaRPr lang="en-GB" sz="3400" dirty="0">
               <a:solidFill>
                 <a:schemeClr val="bg2"/>
               </a:solidFill>
@@ -25850,14 +26007,38 @@
               <a:t>работа</a:t>
             </a:r>
             <a:r>
-              <a:rPr lang="en-GB" sz="3400">
+              <a:rPr lang="en-GB" sz="3400" dirty="0">
                 <a:solidFill>
                   <a:schemeClr val="bg2"/>
                 </a:solidFill>
               </a:rPr>
-              <a:t> с директории</a:t>
-            </a:r>
-            <a:endParaRPr lang="en-GB" sz="3400">
+              <a:t> </a:t>
+            </a:r>
+            <a:r>
+              <a:rPr lang="en-GB" sz="3400" dirty="0" err="1">
+                <a:solidFill>
+                  <a:schemeClr val="bg2"/>
+                </a:solidFill>
+              </a:rPr>
+              <a:t>с</a:t>
+            </a:r>
+            <a:r>
+              <a:rPr lang="en-GB" sz="3400" dirty="0">
+                <a:solidFill>
+                  <a:schemeClr val="bg2"/>
+                </a:solidFill>
+              </a:rPr>
+              <a:t> </a:t>
+            </a:r>
+            <a:r>
+              <a:rPr lang="en-GB" sz="3400" dirty="0" err="1">
+                <a:solidFill>
+                  <a:schemeClr val="bg2"/>
+                </a:solidFill>
+              </a:rPr>
+              <a:t>директории</a:t>
+            </a:r>
+            <a:endParaRPr lang="en-GB" sz="3400" dirty="0">
               <a:solidFill>
                 <a:schemeClr val="bg2"/>
               </a:solidFill>
@@ -26768,8 +26949,8 @@
           <a:p>
             <a:pPr marL="360045" indent="-360045"/>
             <a:r>
-              <a:rPr lang="en-US" sz="3800" dirty="0" err="1"/>
-              <a:t>Стриването</a:t>
+              <a:rPr lang="bg-BG" sz="3800" dirty="0" err="1"/>
+              <a:t>Стриймването</a:t>
             </a:r>
             <a:r>
               <a:rPr lang="en-US" sz="3800" dirty="0"/>
@@ -26843,7 +27024,7 @@
               </a:rPr>
               <a:t>информация</a:t>
             </a:r>
-            <a:endParaRPr lang="en-US" sz="3800" b="1" dirty="0" err="1">
+            <a:endParaRPr lang="en-US" sz="3800" b="1" dirty="0">
               <a:solidFill>
                 <a:schemeClr val="bg1"/>
               </a:solidFill>
@@ -26863,6 +27044,10 @@
             <a:r>
               <a:rPr lang="en-US" sz="3800" dirty="0" err="1"/>
               <a:t>стрийм</a:t>
+            </a:r>
+            <a:r>
+              <a:rPr lang="bg-BG" sz="3800" dirty="0"/>
+              <a:t>,</a:t>
             </a:r>
             <a:r>
               <a:rPr lang="en-US" sz="3800" dirty="0"/>
@@ -27015,7 +27200,7 @@
         </p:blipFill>
         <p:spPr>
           <a:xfrm>
-            <a:off x="2712741" y="4731620"/>
+            <a:off x="2715036" y="4889601"/>
             <a:ext cx="1536720" cy="1617399"/>
           </a:xfrm>
           <a:prstGeom prst="rect">
@@ -27037,7 +27222,7 @@
         </p:nvSpPr>
         <p:spPr bwMode="auto">
           <a:xfrm>
-            <a:off x="4445636" y="4763636"/>
+            <a:off x="4447931" y="4921617"/>
             <a:ext cx="3275747" cy="837982"/>
           </a:xfrm>
           <a:prstGeom prst="rightArrow">
@@ -27109,7 +27294,7 @@
         </p:nvSpPr>
         <p:spPr bwMode="auto">
           <a:xfrm>
-            <a:off x="5016986" y="5739323"/>
+            <a:off x="5019281" y="5897304"/>
             <a:ext cx="2133044" cy="501172"/>
           </a:xfrm>
           <a:prstGeom prst="rect">
@@ -27181,7 +27366,7 @@
         </p:nvGrpSpPr>
         <p:grpSpPr>
           <a:xfrm>
-            <a:off x="7917557" y="4816608"/>
+            <a:off x="7919852" y="4974589"/>
             <a:ext cx="1447423" cy="1447423"/>
             <a:chOff x="8023984" y="3887097"/>
             <a:chExt cx="1447800" cy="1447800"/>
@@ -27785,7 +27970,12 @@
             <p:ph type="body" sz="quarter" idx="10"/>
           </p:nvPr>
         </p:nvSpPr>
-        <p:spPr/>
+        <p:spPr>
+          <a:xfrm>
+            <a:off x="190402" y="1196125"/>
+            <a:ext cx="11930042" cy="5528766"/>
+          </a:xfrm>
+        </p:spPr>
         <p:txBody>
           <a:bodyPr vert="horz" lIns="108000" tIns="36000" rIns="108000" bIns="36000" rtlCol="0" anchor="t">
             <a:normAutofit fontScale="92500"/>
@@ -27982,7 +28172,23 @@
             </a:r>
             <a:r>
               <a:rPr lang="en-US" sz="3350" dirty="0" err="1"/>
-              <a:t>различниводове</a:t>
+              <a:t>различни</a:t>
+            </a:r>
+            <a:r>
+              <a:rPr lang="bg-BG" sz="3350" dirty="0"/>
+              <a:t> </a:t>
+            </a:r>
+            <a:r>
+              <a:rPr lang="en-US" sz="3350" dirty="0" err="1"/>
+              <a:t>в</a:t>
+            </a:r>
+            <a:r>
+              <a:rPr lang="bg-BG" sz="3350" dirty="0"/>
+              <a:t>и</a:t>
+            </a:r>
+            <a:r>
+              <a:rPr lang="en-US" sz="3350" dirty="0" err="1"/>
+              <a:t>дове</a:t>
             </a:r>
             <a:r>
               <a:rPr lang="en-US" sz="3350" dirty="0"/>
@@ -28001,7 +28207,7 @@
               <a:t>за</a:t>
             </a:r>
             <a:r>
-              <a:rPr lang="en-US" sz="3350" dirty="0"/>
+              <a:rPr lang="bg-BG" sz="3350" dirty="0"/>
               <a:t> </a:t>
             </a:r>
             <a:r>
@@ -28051,7 +28257,11 @@
                   <a:schemeClr val="bg1"/>
                 </a:solidFill>
               </a:rPr>
-              <a:t>файл,</a:t>
+              <a:t>файл</a:t>
+            </a:r>
+            <a:r>
+              <a:rPr lang="bg-BG" sz="3199" dirty="0"/>
+              <a:t>,</a:t>
             </a:r>
             <a:r>
               <a:rPr lang="en-US" sz="3199" dirty="0"/>
@@ -28075,7 +28285,7 @@
             </a:r>
             <a:r>
               <a:rPr lang="en-US" sz="3199" dirty="0"/>
-              <a:t>, </a:t>
+              <a:t> </a:t>
             </a:r>
             <a:r>
               <a:rPr lang="bg-BG" sz="3199" dirty="0"/>
@@ -28108,7 +28318,11 @@
               <a:t> </a:t>
             </a:r>
             <a:r>
-              <a:rPr lang="en-US" sz="3350" dirty="0" err="1"/>
+              <a:rPr lang="en-US" sz="3350" b="1" dirty="0" err="1">
+                <a:solidFill>
+                  <a:schemeClr val="bg1"/>
+                </a:solidFill>
+              </a:rPr>
               <a:t>отварят</a:t>
             </a:r>
             <a:r>
@@ -28164,7 +28378,11 @@
               <a:t> </a:t>
             </a:r>
             <a:r>
-              <a:rPr lang="en-US" sz="3350" dirty="0" err="1"/>
+              <a:rPr lang="en-US" sz="3350" b="1" dirty="0" err="1">
+                <a:solidFill>
+                  <a:schemeClr val="bg1"/>
+                </a:solidFill>
+              </a:rPr>
               <a:t>затварят</a:t>
             </a:r>
             <a:r>
@@ -28691,26 +28909,30 @@
               <a:t> </a:t>
             </a:r>
             <a:r>
-              <a:rPr lang="en-US" sz="3350" dirty="0"/>
-              <a:t>е </a:t>
-            </a:r>
-            <a:r>
               <a:rPr lang="en-US" sz="3350" dirty="0" err="1"/>
-              <a:t>сегашна</a:t>
+              <a:t>е</a:t>
             </a:r>
             <a:r>
               <a:rPr lang="en-US" sz="3350" dirty="0"/>
               <a:t> </a:t>
             </a:r>
             <a:r>
-              <a:rPr lang="en-US" sz="3350" dirty="0" err="1"/>
-              <a:t>позиция</a:t>
+              <a:rPr lang="bg-BG" sz="3350" dirty="0"/>
+              <a:t>текущия</a:t>
             </a:r>
             <a:r>
               <a:rPr lang="en-US" sz="3350" dirty="0"/>
               <a:t> </a:t>
             </a:r>
             <a:r>
+              <a:rPr lang="bg-BG" sz="3350" dirty="0"/>
+              <a:t>индекс</a:t>
+            </a:r>
+            <a:r>
+              <a:rPr lang="en-US" sz="3350" dirty="0"/>
+              <a:t> </a:t>
+            </a:r>
+            <a:r>
               <a:rPr lang="en-US" sz="3350" dirty="0" err="1"/>
               <a:t>от</a:t>
             </a:r>
@@ -28722,7 +28944,11 @@
               <a:rPr lang="en-US" sz="3350" dirty="0" err="1"/>
               <a:t>стрийм</a:t>
             </a:r>
-            <a:endParaRPr lang="en-US" sz="3350" dirty="0" err="1">
+            <a:r>
+              <a:rPr lang="bg-BG" sz="3350" dirty="0"/>
+              <a:t>а</a:t>
+            </a:r>
+            <a:endParaRPr lang="en-US" sz="3350" dirty="0">
               <a:cs typeface="Calibri"/>
             </a:endParaRPr>
           </a:p>
@@ -28738,7 +28964,15 @@
                   <a:schemeClr val="bg1"/>
                 </a:solidFill>
               </a:rPr>
-              <a:t>Буфера</a:t>
+              <a:t>Буфер</a:t>
+            </a:r>
+            <a:r>
+              <a:rPr lang="bg-BG" sz="3350" b="1" dirty="0" err="1">
+                <a:solidFill>
+                  <a:schemeClr val="bg1"/>
+                </a:solidFill>
+              </a:rPr>
+              <a:t>ът</a:t>
             </a:r>
             <a:r>
               <a:rPr lang="en-US" sz="3350" b="1" dirty="0">
@@ -28805,18 +29039,18 @@
               <a:t> </a:t>
             </a:r>
             <a:r>
-              <a:rPr lang="en-US" sz="3350" dirty="0" err="1"/>
-              <a:t>сегашна</a:t>
+              <a:rPr lang="bg-BG" sz="3350" dirty="0"/>
+              <a:t>текущия</a:t>
             </a:r>
             <a:r>
               <a:rPr lang="en-US" sz="3350" dirty="0"/>
               <a:t> </a:t>
             </a:r>
             <a:r>
-              <a:rPr lang="en-US" sz="3350" dirty="0" err="1"/>
-              <a:t>позиция</a:t>
-            </a:r>
-            <a:endParaRPr lang="en-US" sz="3350" dirty="0" err="1">
+              <a:rPr lang="bg-BG" sz="3350" dirty="0"/>
+              <a:t>индекс</a:t>
+            </a:r>
+            <a:endParaRPr lang="en-US" sz="3350" dirty="0">
               <a:cs typeface="Calibri"/>
             </a:endParaRPr>
           </a:p>
@@ -28851,7 +29085,7 @@
             </a:r>
             <a:r>
               <a:rPr lang="bg-BG" dirty="0"/>
-              <a:t>Примери</a:t>
+              <a:t>примери</a:t>
             </a:r>
           </a:p>
         </p:txBody>
@@ -32289,10 +32523,10 @@
               <a:t> </a:t>
             </a:r>
             <a:r>
-              <a:rPr lang="en-GB" sz="5350" dirty="0" err="1">
+              <a:rPr lang="bg-BG" sz="5350" dirty="0">
                 <a:cs typeface="Arial"/>
               </a:rPr>
-              <a:t>на</a:t>
+              <a:t>в</a:t>
             </a:r>
             <a:r>
               <a:rPr lang="en-GB" sz="5350" dirty="0">

</xml_diff>